<commit_message>
Some changes in coursework files
</commit_message>
<xml_diff>
--- a/Andronik_WorkWave-Presentation.pptx
+++ b/Andronik_WorkWave-Presentation.pptx
@@ -220,7 +220,7 @@
           <a:p>
             <a:fld id="{5B4C0755-B82B-4D4B-B107-99F24ABFF84A}" type="datetimeFigureOut">
               <a:rPr lang="ru-UA" smtClean="0"/>
-              <a:t>23.05.2024</a:t>
+              <a:t>24.05.2024</a:t>
             </a:fld>
             <a:endParaRPr lang="ru-UA"/>
           </a:p>
@@ -1057,7 +1057,7 @@
           <a:p>
             <a:fld id="{FF93059C-1247-4E28-81D8-385B7923FCFF}" type="datetimeFigureOut">
               <a:rPr lang="ru-UA" smtClean="0"/>
-              <a:t>23.05.2024</a:t>
+              <a:t>24.05.2024</a:t>
             </a:fld>
             <a:endParaRPr lang="ru-UA"/>
           </a:p>
@@ -1257,7 +1257,7 @@
           <a:p>
             <a:fld id="{FF93059C-1247-4E28-81D8-385B7923FCFF}" type="datetimeFigureOut">
               <a:rPr lang="ru-UA" smtClean="0"/>
-              <a:t>23.05.2024</a:t>
+              <a:t>24.05.2024</a:t>
             </a:fld>
             <a:endParaRPr lang="ru-UA"/>
           </a:p>
@@ -1467,7 +1467,7 @@
           <a:p>
             <a:fld id="{FF93059C-1247-4E28-81D8-385B7923FCFF}" type="datetimeFigureOut">
               <a:rPr lang="ru-UA" smtClean="0"/>
-              <a:t>23.05.2024</a:t>
+              <a:t>24.05.2024</a:t>
             </a:fld>
             <a:endParaRPr lang="ru-UA"/>
           </a:p>
@@ -1667,7 +1667,7 @@
           <a:p>
             <a:fld id="{FF93059C-1247-4E28-81D8-385B7923FCFF}" type="datetimeFigureOut">
               <a:rPr lang="ru-UA" smtClean="0"/>
-              <a:t>23.05.2024</a:t>
+              <a:t>24.05.2024</a:t>
             </a:fld>
             <a:endParaRPr lang="ru-UA"/>
           </a:p>
@@ -1943,7 +1943,7 @@
           <a:p>
             <a:fld id="{FF93059C-1247-4E28-81D8-385B7923FCFF}" type="datetimeFigureOut">
               <a:rPr lang="ru-UA" smtClean="0"/>
-              <a:t>23.05.2024</a:t>
+              <a:t>24.05.2024</a:t>
             </a:fld>
             <a:endParaRPr lang="ru-UA"/>
           </a:p>
@@ -2211,7 +2211,7 @@
           <a:p>
             <a:fld id="{FF93059C-1247-4E28-81D8-385B7923FCFF}" type="datetimeFigureOut">
               <a:rPr lang="ru-UA" smtClean="0"/>
-              <a:t>23.05.2024</a:t>
+              <a:t>24.05.2024</a:t>
             </a:fld>
             <a:endParaRPr lang="ru-UA"/>
           </a:p>
@@ -2626,7 +2626,7 @@
           <a:p>
             <a:fld id="{FF93059C-1247-4E28-81D8-385B7923FCFF}" type="datetimeFigureOut">
               <a:rPr lang="ru-UA" smtClean="0"/>
-              <a:t>23.05.2024</a:t>
+              <a:t>24.05.2024</a:t>
             </a:fld>
             <a:endParaRPr lang="ru-UA"/>
           </a:p>
@@ -2768,7 +2768,7 @@
           <a:p>
             <a:fld id="{FF93059C-1247-4E28-81D8-385B7923FCFF}" type="datetimeFigureOut">
               <a:rPr lang="ru-UA" smtClean="0"/>
-              <a:t>23.05.2024</a:t>
+              <a:t>24.05.2024</a:t>
             </a:fld>
             <a:endParaRPr lang="ru-UA"/>
           </a:p>
@@ -2881,7 +2881,7 @@
           <a:p>
             <a:fld id="{FF93059C-1247-4E28-81D8-385B7923FCFF}" type="datetimeFigureOut">
               <a:rPr lang="ru-UA" smtClean="0"/>
-              <a:t>23.05.2024</a:t>
+              <a:t>24.05.2024</a:t>
             </a:fld>
             <a:endParaRPr lang="ru-UA"/>
           </a:p>
@@ -3194,7 +3194,7 @@
           <a:p>
             <a:fld id="{FF93059C-1247-4E28-81D8-385B7923FCFF}" type="datetimeFigureOut">
               <a:rPr lang="ru-UA" smtClean="0"/>
-              <a:t>23.05.2024</a:t>
+              <a:t>24.05.2024</a:t>
             </a:fld>
             <a:endParaRPr lang="ru-UA"/>
           </a:p>
@@ -3483,7 +3483,7 @@
           <a:p>
             <a:fld id="{FF93059C-1247-4E28-81D8-385B7923FCFF}" type="datetimeFigureOut">
               <a:rPr lang="ru-UA" smtClean="0"/>
-              <a:t>23.05.2024</a:t>
+              <a:t>24.05.2024</a:t>
             </a:fld>
             <a:endParaRPr lang="ru-UA"/>
           </a:p>
@@ -3726,7 +3726,7 @@
           <a:p>
             <a:fld id="{FF93059C-1247-4E28-81D8-385B7923FCFF}" type="datetimeFigureOut">
               <a:rPr lang="ru-UA" smtClean="0"/>
-              <a:t>23.05.2024</a:t>
+              <a:t>24.05.2024</a:t>
             </a:fld>
             <a:endParaRPr lang="ru-UA"/>
           </a:p>
@@ -4971,12 +4971,8 @@
               <a:t>ассистент </a:t>
             </a:r>
             <a:r>
-              <a:rPr lang="uk-UA" sz="2000" b="1" dirty="0" err="1"/>
-              <a:t>Ватаманіца</a:t>
-            </a:r>
-            <a:r>
               <a:rPr lang="uk-UA" sz="2000" b="1" dirty="0"/>
-              <a:t> Едгар Вадимович</a:t>
+              <a:t>Ватаманіца Едгар Вадимович</a:t>
             </a:r>
             <a:endParaRPr dirty="0"/>
           </a:p>

</xml_diff>